<commit_message>
edited powerpoint and preliminary presentation
</commit_message>
<xml_diff>
--- a/presentation/preliminary_presentation.pptx
+++ b/presentation/preliminary_presentation.pptx
@@ -4342,6 +4342,17 @@
 <file path=ppt/slides/slide1.xml><?xml version="1.0" encoding="utf-8"?>
 <p:sld xmlns:a="http://schemas.openxmlformats.org/drawingml/2006/main" xmlns:r="http://schemas.openxmlformats.org/officeDocument/2006/relationships" xmlns:p="http://schemas.openxmlformats.org/presentationml/2006/main" xmlns:m="http://schemas.openxmlformats.org/officeDocument/2006/math" xmlns:a14="http://schemas.microsoft.com/office/drawing/2010/main" showMasterSp="1" showMasterPhAnim="1">
   <p:cSld>
+    <p:bg>
+      <p:bgPr>
+        <a:blipFill rotWithShape="1">
+          <a:blip r:embed="rId2"/>
+          <a:srcRect l="0" t="0" r="0" b="0"/>
+          <a:stretch>
+            <a:fillRect/>
+          </a:stretch>
+        </a:blipFill>
+      </p:bgPr>
+    </p:bg>
     <p:spTree>
       <p:nvGrpSpPr>
         <p:cNvPr id="1" name=""/>
@@ -4411,7 +4422,7 @@
           <a:p>
             <a:pPr/>
             <a:r>
-              <a:t>DocCraft: Streamlining Document Intelligence</a:t>
+              <a:t>DocCraft</a:t>
             </a:r>
           </a:p>
         </p:txBody>
@@ -4433,18 +4444,14 @@
           <a:ln w="12700">
             <a:miter lim="400000"/>
           </a:ln>
-          <a:extLst>
-            <a:ext uri="{C572A759-6A51-4108-AA02-DFA0A04FC94B}">
-              <ma14:wrappingTextBoxFlag xmlns:ma14="http://schemas.microsoft.com/office/mac/drawingml/2011/main" val="1"/>
-            </a:ext>
-          </a:extLst>
         </p:spPr>
         <p:txBody>
           <a:bodyPr lIns="50800" tIns="50800" rIns="50800" bIns="50800">
             <a:normAutofit fontScale="100000" lnSpcReduction="0"/>
           </a:bodyPr>
-          <a:lstStyle>
-            <a:lvl1pPr defTabSz="825500">
+          <a:lstStyle/>
+          <a:p>
+            <a:pPr defTabSz="825500">
               <a:lnSpc>
                 <a:spcPct val="100000"/>
               </a:lnSpc>
@@ -4456,13 +4463,7 @@
                   <a:srgbClr val="0076BA"/>
                 </a:solidFill>
               </a:defRPr>
-            </a:lvl1pPr>
-          </a:lstStyle>
-          <a:p>
-            <a:pPr/>
-            <a:r>
-              <a:t>A Python Package for Unified Document Parsing &amp; Benchmarking</a:t>
-            </a:r>
+            </a:pPr>
           </a:p>
         </p:txBody>
       </p:sp>
@@ -4635,8 +4636,8 @@
     </p:tnLst>
     <p:bldLst>
       <p:bldP build="whole" bldLvl="1" animBg="1" rev="0" advAuto="0" spid="173" grpId="2"/>
+      <p:bldP build="whole" bldLvl="1" animBg="1" rev="0" advAuto="0" spid="172" grpId="1"/>
       <p:bldP build="whole" bldLvl="1" animBg="1" rev="0" advAuto="0" spid="171" grpId="3"/>
-      <p:bldP build="whole" bldLvl="1" animBg="1" rev="0" advAuto="0" spid="172" grpId="1"/>
     </p:bldLst>
   </p:timing>
 </p:sld>
@@ -4721,7 +4722,7 @@
           <a:p>
             <a:pPr/>
             <a:r>
-              <a:t>Restaurant owners struggling to track supplier costs</a:t>
+              <a:t>My friends have a problem</a:t>
             </a:r>
           </a:p>
         </p:txBody>
@@ -7157,13 +7158,13 @@
       </p:par>
     </p:tnLst>
     <p:bldLst>
+      <p:bldP build="whole" bldLvl="1" animBg="1" rev="0" advAuto="0" spid="189" grpId="5"/>
+      <p:bldP build="whole" bldLvl="1" animBg="1" rev="0" advAuto="0" spid="176" grpId="2"/>
+      <p:bldP build="whole" bldLvl="1" animBg="1" rev="0" advAuto="0" spid="190" grpId="6"/>
+      <p:bldP build="whole" bldLvl="1" animBg="1" rev="0" advAuto="0" spid="183" grpId="3"/>
+      <p:bldP build="whole" bldLvl="1" animBg="1" rev="0" advAuto="0" spid="186" grpId="4"/>
+      <p:bldP build="whole" bldLvl="1" animBg="1" rev="0" advAuto="0" spid="193" grpId="7"/>
       <p:bldP build="whole" bldLvl="1" animBg="1" rev="0" advAuto="0" spid="175" grpId="1"/>
-      <p:bldP build="whole" bldLvl="1" animBg="1" rev="0" advAuto="0" spid="193" grpId="7"/>
-      <p:bldP build="whole" bldLvl="1" animBg="1" rev="0" advAuto="0" spid="176" grpId="2"/>
-      <p:bldP build="whole" bldLvl="1" animBg="1" rev="0" advAuto="0" spid="189" grpId="5"/>
-      <p:bldP build="whole" bldLvl="1" animBg="1" rev="0" advAuto="0" spid="186" grpId="4"/>
-      <p:bldP build="whole" bldLvl="1" animBg="1" rev="0" advAuto="0" spid="183" grpId="3"/>
-      <p:bldP build="whole" bldLvl="1" animBg="1" rev="0" advAuto="0" spid="190" grpId="6"/>
     </p:bldLst>
   </p:timing>
 </p:sld>
@@ -7172,6 +7173,17 @@
 <file path=ppt/slides/slide3.xml><?xml version="1.0" encoding="utf-8"?>
 <p:sld xmlns:a="http://schemas.openxmlformats.org/drawingml/2006/main" xmlns:r="http://schemas.openxmlformats.org/officeDocument/2006/relationships" xmlns:p="http://schemas.openxmlformats.org/presentationml/2006/main" xmlns:m="http://schemas.openxmlformats.org/officeDocument/2006/math" xmlns:a14="http://schemas.microsoft.com/office/drawing/2010/main" showMasterSp="1" showMasterPhAnim="1">
   <p:cSld>
+    <p:bg>
+      <p:bgPr>
+        <a:blipFill rotWithShape="1">
+          <a:blip r:embed="rId2"/>
+          <a:srcRect l="0" t="0" r="0" b="0"/>
+          <a:stretch>
+            <a:fillRect/>
+          </a:stretch>
+        </a:blipFill>
+      </p:bgPr>
+    </p:bg>
     <p:spTree>
       <p:nvGrpSpPr>
         <p:cNvPr id="1" name=""/>
@@ -8964,11 +8976,11 @@
       </p:par>
     </p:tnLst>
     <p:bldLst>
+      <p:bldP build="whole" bldLvl="1" animBg="1" rev="0" advAuto="0" spid="211" grpId="6"/>
+      <p:bldP build="whole" bldLvl="1" animBg="1" rev="0" advAuto="0" spid="199" grpId="4"/>
       <p:bldP build="whole" bldLvl="1" animBg="1" rev="0" advAuto="0" spid="196" grpId="2"/>
+      <p:bldP build="whole" bldLvl="1" animBg="1" rev="0" advAuto="0" spid="202" grpId="5"/>
       <p:bldP build="whole" bldLvl="1" animBg="1" rev="0" advAuto="0" spid="195" grpId="1"/>
-      <p:bldP build="whole" bldLvl="1" animBg="1" rev="0" advAuto="0" spid="199" grpId="4"/>
-      <p:bldP build="whole" bldLvl="1" animBg="1" rev="0" advAuto="0" spid="202" grpId="5"/>
-      <p:bldP build="whole" bldLvl="1" animBg="1" rev="0" advAuto="0" spid="211" grpId="6"/>
       <p:bldP build="whole" bldLvl="1" animBg="1" rev="0" advAuto="0" spid="208" grpId="3"/>
     </p:bldLst>
   </p:timing>
@@ -9054,7 +9066,7 @@
           <a:p>
             <a:pPr/>
             <a:r>
-              <a:t>Create a Database</a:t>
+              <a:t>It’s simple, really.</a:t>
             </a:r>
           </a:p>
         </p:txBody>
@@ -10570,11 +10582,11 @@
       </p:par>
     </p:tnLst>
     <p:bldLst>
+      <p:bldP build="whole" bldLvl="1" animBg="1" rev="0" advAuto="0" spid="217" grpId="4"/>
       <p:bldP build="whole" bldLvl="1" animBg="1" rev="0" advAuto="0" spid="214" grpId="2"/>
-      <p:bldP build="whole" bldLvl="1" animBg="1" rev="0" advAuto="0" spid="213" grpId="1"/>
-      <p:bldP build="whole" bldLvl="1" animBg="1" rev="0" advAuto="0" spid="217" grpId="4"/>
       <p:bldP build="whole" bldLvl="1" animBg="1" rev="0" advAuto="0" spid="220" grpId="5"/>
       <p:bldP build="whole" bldLvl="1" animBg="1" rev="0" advAuto="0" spid="226" grpId="3"/>
+      <p:bldP build="whole" bldLvl="1" animBg="1" rev="0" advAuto="0" spid="213" grpId="1"/>
     </p:bldLst>
   </p:timing>
 </p:sld>
@@ -10688,7 +10700,7 @@
           <a:p>
             <a:pPr/>
             <a:r>
-              <a:t>Processing Data into a Database can be hard!</a:t>
+              <a:t>It’s not that simple, really.</a:t>
             </a:r>
           </a:p>
         </p:txBody>
@@ -10937,8 +10949,8 @@
         </p:nvSpPr>
         <p:spPr>
           <a:xfrm>
-            <a:off x="19697968" y="5691844"/>
-            <a:ext cx="3869791" cy="3972329"/>
+            <a:off x="19723541" y="4109108"/>
+            <a:ext cx="3869791" cy="5881381"/>
           </a:xfrm>
           <a:prstGeom prst="rect">
             <a:avLst/>
@@ -10956,21 +10968,53 @@
           <a:bodyPr lIns="50800" tIns="50800" rIns="50800" bIns="50800" anchor="ctr">
             <a:spAutoFit/>
           </a:bodyPr>
-          <a:lstStyle>
-            <a:lvl1pPr defTabSz="825500">
+          <a:lstStyle/>
+          <a:p>
+            <a:pPr marL="421105" indent="-421105" defTabSz="825500">
               <a:lnSpc>
                 <a:spcPct val="100000"/>
               </a:lnSpc>
               <a:spcBef>
                 <a:spcPts val="0"/>
               </a:spcBef>
-              <a:defRPr b="1" sz="4200"/>
-            </a:lvl1pPr>
-          </a:lstStyle>
+              <a:buSzPct val="100000"/>
+              <a:buChar char="-"/>
+              <a:defRPr b="1" sz="3100"/>
+            </a:pPr>
+            <a:r>
+              <a:t>Manual Invoice processing is error-prone and time-consuming</a:t>
+            </a:r>
+          </a:p>
           <a:p>
-            <a:pPr/>
+            <a:pPr marL="421105" indent="-421105" defTabSz="825500">
+              <a:lnSpc>
+                <a:spcPct val="100000"/>
+              </a:lnSpc>
+              <a:spcBef>
+                <a:spcPts val="0"/>
+              </a:spcBef>
+              <a:buSzPct val="100000"/>
+              <a:buChar char="-"/>
+              <a:defRPr b="1" sz="3100"/>
+            </a:pPr>
             <a:r>
-              <a:t>Manual Invoice processing is error-prone and time-consuming!</a:t>
+              <a:t>Image quality can hugely vary</a:t>
+            </a:r>
+          </a:p>
+          <a:p>
+            <a:pPr marL="421105" indent="-421105" defTabSz="825500">
+              <a:lnSpc>
+                <a:spcPct val="100000"/>
+              </a:lnSpc>
+              <a:spcBef>
+                <a:spcPts val="0"/>
+              </a:spcBef>
+              <a:buSzPct val="100000"/>
+              <a:buChar char="-"/>
+              <a:defRPr b="1" sz="3100"/>
+            </a:pPr>
+            <a:r>
+              <a:t>In our specific use-case, we need to identify and correctly parse line items (very complex)</a:t>
             </a:r>
           </a:p>
         </p:txBody>
@@ -11416,11 +11460,11 @@
     <p:bldLst>
       <p:bldP build="whole" bldLvl="1" animBg="1" rev="0" advAuto="0" spid="241" grpId="6"/>
       <p:bldP build="whole" bldLvl="1" animBg="1" rev="0" advAuto="0" spid="233" grpId="4"/>
-      <p:bldP build="whole" bldLvl="1" animBg="1" rev="0" advAuto="0" spid="228" grpId="3"/>
-      <p:bldP build="whole" bldLvl="1" animBg="1" rev="0" advAuto="0" spid="230" grpId="2"/>
-      <p:bldP build="whole" bldLvl="1" animBg="1" rev="0" advAuto="0" spid="236" grpId="5"/>
       <p:bldP build="whole" bldLvl="1" animBg="1" rev="0" advAuto="0" spid="229" grpId="1"/>
       <p:bldP build="whole" bldLvl="1" animBg="1" rev="0" advAuto="0" spid="238" grpId="7"/>
+      <p:bldP build="whole" bldLvl="1" animBg="1" rev="0" advAuto="0" spid="230" grpId="2"/>
+      <p:bldP build="whole" bldLvl="1" animBg="1" rev="0" advAuto="0" spid="228" grpId="3"/>
+      <p:bldP build="whole" bldLvl="1" animBg="1" rev="0" advAuto="0" spid="236" grpId="5"/>
     </p:bldLst>
   </p:timing>
 </p:sld>
@@ -12471,11 +12515,11 @@
       </p:par>
     </p:tnLst>
     <p:bldLst>
+      <p:bldP build="whole" bldLvl="1" animBg="1" rev="0" advAuto="0" spid="249" grpId="3"/>
+      <p:bldP build="whole" bldLvl="1" animBg="1" rev="0" advAuto="0" spid="244" grpId="2"/>
       <p:bldP build="whole" bldLvl="1" animBg="1" rev="0" advAuto="0" spid="250" grpId="4"/>
+      <p:bldP build="whole" bldLvl="1" animBg="1" rev="0" advAuto="0" spid="243" grpId="1"/>
       <p:bldP build="whole" bldLvl="1" animBg="1" rev="0" advAuto="0" spid="250" grpId="5"/>
-      <p:bldP build="whole" bldLvl="1" animBg="1" rev="0" advAuto="0" spid="244" grpId="2"/>
-      <p:bldP build="whole" bldLvl="1" animBg="1" rev="0" advAuto="0" spid="243" grpId="1"/>
-      <p:bldP build="whole" bldLvl="1" animBg="1" rev="0" advAuto="0" spid="249" grpId="3"/>
     </p:bldLst>
   </p:timing>
 </p:sld>
@@ -12484,6 +12528,17 @@
 <file path=ppt/slides/slide7.xml><?xml version="1.0" encoding="utf-8"?>
 <p:sld xmlns:a="http://schemas.openxmlformats.org/drawingml/2006/main" xmlns:r="http://schemas.openxmlformats.org/officeDocument/2006/relationships" xmlns:p="http://schemas.openxmlformats.org/presentationml/2006/main" xmlns:m="http://schemas.openxmlformats.org/officeDocument/2006/math" xmlns:a14="http://schemas.microsoft.com/office/drawing/2010/main" showMasterSp="1" showMasterPhAnim="1">
   <p:cSld>
+    <p:bg>
+      <p:bgPr>
+        <a:blipFill rotWithShape="1">
+          <a:blip r:embed="rId2"/>
+          <a:srcRect l="0" t="0" r="0" b="0"/>
+          <a:stretch>
+            <a:fillRect/>
+          </a:stretch>
+        </a:blipFill>
+      </p:bgPr>
+    </p:bg>
     <p:spTree>
       <p:nvGrpSpPr>
         <p:cNvPr id="1" name=""/>
@@ -12507,7 +12562,7 @@
           <p:nvPr/>
         </p:nvPicPr>
         <p:blipFill>
-          <a:blip r:embed="rId2">
+          <a:blip r:embed="rId3">
             <a:extLst/>
           </a:blip>
           <a:srcRect l="0" t="0" r="0" b="2286"/>
@@ -15302,17 +15357,17 @@
       </p:par>
     </p:tnLst>
     <p:bldLst>
-      <p:bldP build="whole" bldLvl="1" animBg="1" rev="0" advAuto="0" spid="266" grpId="6"/>
+      <p:bldP build="whole" bldLvl="1" animBg="1" rev="0" advAuto="0" spid="252" grpId="3"/>
+      <p:bldP build="whole" bldLvl="1" animBg="1" rev="0" advAuto="0" spid="263" grpId="8"/>
+      <p:bldP build="whole" bldLvl="1" animBg="1" rev="0" advAuto="0" spid="275" grpId="7"/>
       <p:bldP build="whole" bldLvl="1" animBg="1" rev="0" advAuto="0" spid="269" grpId="4"/>
       <p:bldP build="whole" bldLvl="1" animBg="1" rev="0" advAuto="0" spid="276" grpId="11"/>
       <p:bldP build="whole" bldLvl="1" animBg="1" rev="0" advAuto="0" spid="254" grpId="2"/>
+      <p:bldP build="whole" bldLvl="1" animBg="1" rev="0" advAuto="0" spid="253" grpId="1"/>
+      <p:bldP build="whole" bldLvl="1" animBg="1" rev="0" advAuto="0" spid="266" grpId="6"/>
+      <p:bldP build="whole" bldLvl="1" animBg="1" rev="0" advAuto="0" spid="257" grpId="5"/>
+      <p:bldP build="whole" bldLvl="1" animBg="1" rev="0" advAuto="0" spid="272" grpId="9"/>
       <p:bldP build="whole" bldLvl="1" animBg="1" rev="0" advAuto="0" spid="260" grpId="10"/>
-      <p:bldP build="whole" bldLvl="1" animBg="1" rev="0" advAuto="0" spid="272" grpId="9"/>
-      <p:bldP build="whole" bldLvl="1" animBg="1" rev="0" advAuto="0" spid="263" grpId="8"/>
-      <p:bldP build="whole" bldLvl="1" animBg="1" rev="0" advAuto="0" spid="252" grpId="3"/>
-      <p:bldP build="whole" bldLvl="1" animBg="1" rev="0" advAuto="0" spid="253" grpId="1"/>
-      <p:bldP build="whole" bldLvl="1" animBg="1" rev="0" advAuto="0" spid="275" grpId="7"/>
-      <p:bldP build="whole" bldLvl="1" animBg="1" rev="0" advAuto="0" spid="257" grpId="5"/>
     </p:bldLst>
   </p:timing>
 </p:sld>
@@ -15321,6 +15376,17 @@
 <file path=ppt/slides/slide8.xml><?xml version="1.0" encoding="utf-8"?>
 <p:sld xmlns:a="http://schemas.openxmlformats.org/drawingml/2006/main" xmlns:r="http://schemas.openxmlformats.org/officeDocument/2006/relationships" xmlns:p="http://schemas.openxmlformats.org/presentationml/2006/main" xmlns:m="http://schemas.openxmlformats.org/officeDocument/2006/math" xmlns:a14="http://schemas.microsoft.com/office/drawing/2010/main" showMasterSp="1" showMasterPhAnim="1">
   <p:cSld>
+    <p:bg>
+      <p:bgPr>
+        <a:blipFill rotWithShape="1">
+          <a:blip r:embed="rId2"/>
+          <a:srcRect l="0" t="0" r="0" b="0"/>
+          <a:stretch>
+            <a:fillRect/>
+          </a:stretch>
+        </a:blipFill>
+      </p:bgPr>
+    </p:bg>
     <p:spTree>
       <p:nvGrpSpPr>
         <p:cNvPr id="1" name=""/>
@@ -15400,7 +15466,7 @@
           <p:nvPr/>
         </p:nvPicPr>
         <p:blipFill>
-          <a:blip r:embed="rId2">
+          <a:blip r:embed="rId3">
             <a:extLst/>
           </a:blip>
           <a:srcRect l="0" t="0" r="0" b="2640"/>
@@ -15429,8 +15495,8 @@
         </p:nvSpPr>
         <p:spPr>
           <a:xfrm>
-            <a:off x="12700268" y="3727748"/>
-            <a:ext cx="9625597" cy="3972328"/>
+            <a:off x="12700268" y="3080048"/>
+            <a:ext cx="9625597" cy="5267728"/>
           </a:xfrm>
           <a:prstGeom prst="rect">
             <a:avLst/>
@@ -15460,7 +15526,7 @@
               <a:defRPr b="1" sz="4200"/>
             </a:pPr>
             <a:r>
-              <a:t>DocCraft (intended) features</a:t>
+              <a:t>DocCraft: A Python Package for Unified Document Parsing &amp; Benchmarking</a:t>
             </a:r>
           </a:p>
           <a:p>
@@ -16449,15 +16515,15 @@
       </p:par>
     </p:tnLst>
     <p:bldLst>
+      <p:bldP build="whole" bldLvl="1" animBg="1" rev="0" advAuto="0" spid="284" grpId="5"/>
+      <p:bldP build="whole" bldLvl="1" animBg="1" rev="0" advAuto="0" spid="287" grpId="7"/>
+      <p:bldP build="whole" bldLvl="1" animBg="1" rev="0" advAuto="0" spid="290" grpId="9"/>
+      <p:bldP build="whole" bldLvl="1" animBg="1" rev="0" advAuto="0" spid="291" grpId="6"/>
       <p:bldP build="whole" bldLvl="1" animBg="1" rev="0" advAuto="0" spid="279" grpId="2"/>
+      <p:bldP build="whole" bldLvl="1" animBg="1" rev="0" advAuto="0" spid="278" grpId="1"/>
+      <p:bldP build="whole" bldLvl="1" animBg="1" rev="0" advAuto="0" spid="280" grpId="3"/>
       <p:bldP build="whole" bldLvl="1" animBg="1" rev="0" advAuto="0" spid="292" grpId="8"/>
-      <p:bldP build="whole" bldLvl="1" animBg="1" rev="0" advAuto="0" spid="278" grpId="1"/>
-      <p:bldP build="whole" bldLvl="1" animBg="1" rev="0" advAuto="0" spid="291" grpId="6"/>
-      <p:bldP build="whole" bldLvl="1" animBg="1" rev="0" advAuto="0" spid="287" grpId="7"/>
-      <p:bldP build="whole" bldLvl="1" animBg="1" rev="0" advAuto="0" spid="284" grpId="5"/>
       <p:bldP build="whole" bldLvl="1" animBg="1" rev="0" advAuto="0" spid="281" grpId="4"/>
-      <p:bldP build="whole" bldLvl="1" animBg="1" rev="0" advAuto="0" spid="290" grpId="9"/>
-      <p:bldP build="whole" bldLvl="1" animBg="1" rev="0" advAuto="0" spid="280" grpId="3"/>
     </p:bldLst>
   </p:timing>
 </p:sld>
@@ -16466,6 +16532,17 @@
 <file path=ppt/slides/slide9.xml><?xml version="1.0" encoding="utf-8"?>
 <p:sld xmlns:a="http://schemas.openxmlformats.org/drawingml/2006/main" xmlns:r="http://schemas.openxmlformats.org/officeDocument/2006/relationships" xmlns:p="http://schemas.openxmlformats.org/presentationml/2006/main" xmlns:m="http://schemas.openxmlformats.org/officeDocument/2006/math" xmlns:a14="http://schemas.microsoft.com/office/drawing/2010/main" showMasterSp="1" showMasterPhAnim="1">
   <p:cSld>
+    <p:bg>
+      <p:bgPr>
+        <a:blipFill rotWithShape="1">
+          <a:blip r:embed="rId2"/>
+          <a:srcRect l="0" t="0" r="0" b="0"/>
+          <a:stretch>
+            <a:fillRect/>
+          </a:stretch>
+        </a:blipFill>
+      </p:bgPr>
+    </p:bg>
     <p:spTree>
       <p:nvGrpSpPr>
         <p:cNvPr id="1" name=""/>

</xml_diff>